<commit_message>
Slides over uitbreidbaarheid en robuustheid
</commit_message>
<xml_diff>
--- a/presentations/Iteratie2/SWOP – TaskMan iteratie 2[TMAN_UPDATES].pptx
+++ b/presentations/Iteratie2/SWOP – TaskMan iteratie 2[TMAN_UPDATES].pptx
@@ -3685,11 +3685,7 @@
             </a:pPr>
             <a:r>
               <a:rPr lang="nl-BE" sz="1800" dirty="0" smtClean="0"/>
-              <a:t>	</a:t>
-            </a:r>
-            <a:r>
-              <a:rPr lang="nl-BE" sz="1800" dirty="0" smtClean="0"/>
-              <a:t>70/40/12</a:t>
+              <a:t>	70/40/12</a:t>
             </a:r>
             <a:endParaRPr lang="nl-BE" sz="1800" dirty="0"/>
           </a:p>
@@ -4271,14 +4267,16 @@
         </p:nvSpPr>
         <p:spPr/>
         <p:txBody>
-          <a:bodyPr/>
-          <a:lstStyle/>
-          <a:p>
-            <a:r>
-              <a:rPr lang="nl-BE" dirty="0" smtClean="0"/>
+          <a:bodyPr>
+            <a:normAutofit/>
+          </a:bodyPr>
+          <a:lstStyle/>
+          <a:p>
+            <a:r>
+              <a:rPr lang="nl-BE" sz="4800" dirty="0" smtClean="0"/>
               <a:t>T-Man file updates</a:t>
             </a:r>
-            <a:endParaRPr lang="nl-BE" dirty="0"/>
+            <a:endParaRPr lang="nl-BE" sz="4800" dirty="0"/>
           </a:p>
         </p:txBody>
       </p:sp>
@@ -4413,14 +4411,16 @@
         </p:nvSpPr>
         <p:spPr/>
         <p:txBody>
-          <a:bodyPr/>
-          <a:lstStyle/>
-          <a:p>
-            <a:r>
-              <a:rPr lang="nl-BE" dirty="0" smtClean="0"/>
+          <a:bodyPr>
+            <a:normAutofit/>
+          </a:bodyPr>
+          <a:lstStyle/>
+          <a:p>
+            <a:r>
+              <a:rPr lang="nl-BE" sz="4800" dirty="0" smtClean="0"/>
               <a:t>T-Man file updates</a:t>
             </a:r>
-            <a:endParaRPr lang="nl-BE" dirty="0"/>
+            <a:endParaRPr lang="nl-BE" sz="4800" dirty="0"/>
           </a:p>
         </p:txBody>
       </p:sp>
@@ -4555,14 +4555,16 @@
         </p:nvSpPr>
         <p:spPr/>
         <p:txBody>
-          <a:bodyPr/>
-          <a:lstStyle/>
-          <a:p>
-            <a:r>
-              <a:rPr lang="nl-BE" dirty="0" smtClean="0"/>
+          <a:bodyPr>
+            <a:normAutofit/>
+          </a:bodyPr>
+          <a:lstStyle/>
+          <a:p>
+            <a:r>
+              <a:rPr lang="nl-BE" sz="4800" dirty="0" smtClean="0"/>
               <a:t>T-Man file updates</a:t>
             </a:r>
-            <a:endParaRPr lang="nl-BE" dirty="0"/>
+            <a:endParaRPr lang="nl-BE" sz="4800" dirty="0"/>
           </a:p>
         </p:txBody>
       </p:sp>
@@ -4696,14 +4698,16 @@
         </p:nvSpPr>
         <p:spPr/>
         <p:txBody>
-          <a:bodyPr/>
-          <a:lstStyle/>
-          <a:p>
-            <a:r>
-              <a:rPr lang="nl-BE" dirty="0" smtClean="0"/>
+          <a:bodyPr>
+            <a:normAutofit/>
+          </a:bodyPr>
+          <a:lstStyle/>
+          <a:p>
+            <a:r>
+              <a:rPr lang="nl-BE" sz="4800" dirty="0" smtClean="0"/>
               <a:t>T-Man file updates</a:t>
             </a:r>
-            <a:endParaRPr lang="nl-BE" dirty="0"/>
+            <a:endParaRPr lang="nl-BE" sz="4800" dirty="0"/>
           </a:p>
         </p:txBody>
       </p:sp>

</xml_diff>